<commit_message>
final presentation + pdf
</commit_message>
<xml_diff>
--- a/FinalPresentation_Parallel Connected Components.pptx
+++ b/FinalPresentation_Parallel Connected Components.pptx
@@ -187,7 +187,7 @@
             <a:srgbClr val="A4A3A4"/>
           </p15:clr>
         </p15:guide>
-        <p15:guide id="6" orient="horz" pos="1608" userDrawn="1">
+        <p15:guide id="6" orient="horz" pos="2016" userDrawn="1">
           <p15:clr>
             <a:srgbClr val="A4A3A4"/>
           </p15:clr>
@@ -18241,30 +18241,17 @@
           <a:p>
             <a:r>
               <a:rPr lang="en-US" dirty="0" smtClean="0"/>
-              <a:t>Program developed to convert</a:t>
+              <a:t>Benefit kicks</a:t>
             </a:r>
             <a:r>
               <a:rPr lang="en-US" baseline="0" dirty="0" smtClean="0"/>
-              <a:t> .</a:t>
+              <a:t> in at about 100 thousand vertices</a:t>
             </a:r>
-            <a:r>
-              <a:rPr lang="en-US" baseline="0" dirty="0" err="1" smtClean="0"/>
-              <a:t>obj</a:t>
-            </a:r>
+          </a:p>
+          <a:p>
             <a:r>
               <a:rPr lang="en-US" baseline="0" dirty="0" smtClean="0"/>
-              <a:t> files</a:t>
-            </a:r>
-            <a:endParaRPr lang="en-US" dirty="0" smtClean="0"/>
-          </a:p>
-          <a:p>
-            <a:r>
-              <a:rPr lang="en-US" dirty="0" smtClean="0"/>
-              <a:t>Number</a:t>
-            </a:r>
-            <a:r>
-              <a:rPr lang="en-US" baseline="0" dirty="0" smtClean="0"/>
-              <a:t> components checked with program called trimesh2, programming used for processing meshes</a:t>
+              <a:t>About 10x speed up at 1 million</a:t>
             </a:r>
             <a:endParaRPr lang="en-US" dirty="0"/>
           </a:p>
@@ -18287,6 +18274,648 @@
           <a:p>
             <a:fld id="{E9CF5C0B-8884-41E5-88A3-9679438C4701}" type="slidenum">
               <a:rPr lang="en-US" smtClean="0"/>
+              <a:t>42</a:t>
+            </a:fld>
+            <a:endParaRPr lang="en-US"/>
+          </a:p>
+        </p:txBody>
+      </p:sp>
+    </p:spTree>
+    <p:extLst>
+      <p:ext uri="{BB962C8B-B14F-4D97-AF65-F5344CB8AC3E}">
+        <p14:creationId xmlns:p14="http://schemas.microsoft.com/office/powerpoint/2010/main" val="3729997324"/>
+      </p:ext>
+    </p:extLst>
+  </p:cSld>
+  <p:clrMapOvr>
+    <a:masterClrMapping/>
+  </p:clrMapOvr>
+</p:notes>
+</file>
+
+<file path=ppt/notesSlides/notesSlide11.xml><?xml version="1.0" encoding="utf-8"?>
+<p:notes xmlns:a="http://schemas.openxmlformats.org/drawingml/2006/main" xmlns:r="http://schemas.openxmlformats.org/officeDocument/2006/relationships" xmlns:p="http://schemas.openxmlformats.org/presentationml/2006/main">
+  <p:cSld>
+    <p:spTree>
+      <p:nvGrpSpPr>
+        <p:cNvPr id="1" name=""/>
+        <p:cNvGrpSpPr/>
+        <p:nvPr/>
+      </p:nvGrpSpPr>
+      <p:grpSpPr>
+        <a:xfrm>
+          <a:off x="0" y="0"/>
+          <a:ext cx="0" cy="0"/>
+          <a:chOff x="0" y="0"/>
+          <a:chExt cx="0" cy="0"/>
+        </a:xfrm>
+      </p:grpSpPr>
+      <p:sp>
+        <p:nvSpPr>
+          <p:cNvPr id="2" name="Slide Image Placeholder 1"/>
+          <p:cNvSpPr>
+            <a:spLocks noGrp="1" noRot="1" noChangeAspect="1"/>
+          </p:cNvSpPr>
+          <p:nvPr>
+            <p:ph type="sldImg"/>
+          </p:nvPr>
+        </p:nvSpPr>
+        <p:spPr/>
+      </p:sp>
+      <p:sp>
+        <p:nvSpPr>
+          <p:cNvPr id="3" name="Notes Placeholder 2"/>
+          <p:cNvSpPr>
+            <a:spLocks noGrp="1"/>
+          </p:cNvSpPr>
+          <p:nvPr>
+            <p:ph type="body" idx="1"/>
+          </p:nvPr>
+        </p:nvSpPr>
+        <p:spPr/>
+        <p:txBody>
+          <a:bodyPr/>
+          <a:lstStyle/>
+          <a:p>
+            <a:r>
+              <a:rPr lang="en-US" dirty="0" smtClean="0"/>
+              <a:t>Atomic performs</a:t>
+            </a:r>
+            <a:r>
+              <a:rPr lang="en-US" baseline="0" dirty="0" smtClean="0"/>
+              <a:t> a bit worse</a:t>
+            </a:r>
+            <a:endParaRPr lang="en-US" dirty="0"/>
+          </a:p>
+        </p:txBody>
+      </p:sp>
+      <p:sp>
+        <p:nvSpPr>
+          <p:cNvPr id="4" name="Slide Number Placeholder 3"/>
+          <p:cNvSpPr>
+            <a:spLocks noGrp="1"/>
+          </p:cNvSpPr>
+          <p:nvPr>
+            <p:ph type="sldNum" sz="quarter" idx="10"/>
+          </p:nvPr>
+        </p:nvSpPr>
+        <p:spPr/>
+        <p:txBody>
+          <a:bodyPr/>
+          <a:lstStyle/>
+          <a:p>
+            <a:fld id="{E9CF5C0B-8884-41E5-88A3-9679438C4701}" type="slidenum">
+              <a:rPr lang="en-US" smtClean="0"/>
+              <a:t>44</a:t>
+            </a:fld>
+            <a:endParaRPr lang="en-US"/>
+          </a:p>
+        </p:txBody>
+      </p:sp>
+    </p:spTree>
+    <p:extLst>
+      <p:ext uri="{BB962C8B-B14F-4D97-AF65-F5344CB8AC3E}">
+        <p14:creationId xmlns:p14="http://schemas.microsoft.com/office/powerpoint/2010/main" val="3300259124"/>
+      </p:ext>
+    </p:extLst>
+  </p:cSld>
+  <p:clrMapOvr>
+    <a:masterClrMapping/>
+  </p:clrMapOvr>
+</p:notes>
+</file>
+
+<file path=ppt/notesSlides/notesSlide12.xml><?xml version="1.0" encoding="utf-8"?>
+<p:notes xmlns:a="http://schemas.openxmlformats.org/drawingml/2006/main" xmlns:r="http://schemas.openxmlformats.org/officeDocument/2006/relationships" xmlns:p="http://schemas.openxmlformats.org/presentationml/2006/main">
+  <p:cSld>
+    <p:spTree>
+      <p:nvGrpSpPr>
+        <p:cNvPr id="1" name=""/>
+        <p:cNvGrpSpPr/>
+        <p:nvPr/>
+      </p:nvGrpSpPr>
+      <p:grpSpPr>
+        <a:xfrm>
+          <a:off x="0" y="0"/>
+          <a:ext cx="0" cy="0"/>
+          <a:chOff x="0" y="0"/>
+          <a:chExt cx="0" cy="0"/>
+        </a:xfrm>
+      </p:grpSpPr>
+      <p:sp>
+        <p:nvSpPr>
+          <p:cNvPr id="2" name="Slide Image Placeholder 1"/>
+          <p:cNvSpPr>
+            <a:spLocks noGrp="1" noRot="1" noChangeAspect="1"/>
+          </p:cNvSpPr>
+          <p:nvPr>
+            <p:ph type="sldImg"/>
+          </p:nvPr>
+        </p:nvSpPr>
+        <p:spPr/>
+      </p:sp>
+      <p:sp>
+        <p:nvSpPr>
+          <p:cNvPr id="3" name="Notes Placeholder 2"/>
+          <p:cNvSpPr>
+            <a:spLocks noGrp="1"/>
+          </p:cNvSpPr>
+          <p:nvPr>
+            <p:ph type="body" idx="1"/>
+          </p:nvPr>
+        </p:nvSpPr>
+        <p:spPr/>
+        <p:txBody>
+          <a:bodyPr/>
+          <a:lstStyle/>
+          <a:p>
+            <a:r>
+              <a:rPr lang="en-US" dirty="0" smtClean="0"/>
+              <a:t>Parallel </a:t>
+            </a:r>
+            <a:r>
+              <a:rPr lang="en-US" dirty="0" err="1" smtClean="0"/>
+              <a:t>bfs</a:t>
+            </a:r>
+            <a:r>
+              <a:rPr lang="en-US" dirty="0" smtClean="0"/>
+              <a:t> and atomic parallel</a:t>
+            </a:r>
+            <a:r>
+              <a:rPr lang="en-US" baseline="0" dirty="0" smtClean="0"/>
+              <a:t> </a:t>
+            </a:r>
+            <a:r>
+              <a:rPr lang="en-US" baseline="0" dirty="0" err="1" smtClean="0"/>
+              <a:t>bfs</a:t>
+            </a:r>
+            <a:r>
+              <a:rPr lang="en-US" baseline="0" dirty="0" smtClean="0"/>
+              <a:t> are winning, followed close behind by serial union find</a:t>
+            </a:r>
+            <a:endParaRPr lang="en-US" dirty="0"/>
+          </a:p>
+        </p:txBody>
+      </p:sp>
+      <p:sp>
+        <p:nvSpPr>
+          <p:cNvPr id="4" name="Slide Number Placeholder 3"/>
+          <p:cNvSpPr>
+            <a:spLocks noGrp="1"/>
+          </p:cNvSpPr>
+          <p:nvPr>
+            <p:ph type="sldNum" sz="quarter" idx="10"/>
+          </p:nvPr>
+        </p:nvSpPr>
+        <p:spPr/>
+        <p:txBody>
+          <a:bodyPr/>
+          <a:lstStyle/>
+          <a:p>
+            <a:fld id="{E9CF5C0B-8884-41E5-88A3-9679438C4701}" type="slidenum">
+              <a:rPr lang="en-US" smtClean="0"/>
+              <a:t>46</a:t>
+            </a:fld>
+            <a:endParaRPr lang="en-US"/>
+          </a:p>
+        </p:txBody>
+      </p:sp>
+    </p:spTree>
+    <p:extLst>
+      <p:ext uri="{BB962C8B-B14F-4D97-AF65-F5344CB8AC3E}">
+        <p14:creationId xmlns:p14="http://schemas.microsoft.com/office/powerpoint/2010/main" val="2413376534"/>
+      </p:ext>
+    </p:extLst>
+  </p:cSld>
+  <p:clrMapOvr>
+    <a:masterClrMapping/>
+  </p:clrMapOvr>
+</p:notes>
+</file>
+
+<file path=ppt/notesSlides/notesSlide13.xml><?xml version="1.0" encoding="utf-8"?>
+<p:notes xmlns:a="http://schemas.openxmlformats.org/drawingml/2006/main" xmlns:r="http://schemas.openxmlformats.org/officeDocument/2006/relationships" xmlns:p="http://schemas.openxmlformats.org/presentationml/2006/main">
+  <p:cSld>
+    <p:spTree>
+      <p:nvGrpSpPr>
+        <p:cNvPr id="1" name=""/>
+        <p:cNvGrpSpPr/>
+        <p:nvPr/>
+      </p:nvGrpSpPr>
+      <p:grpSpPr>
+        <a:xfrm>
+          <a:off x="0" y="0"/>
+          <a:ext cx="0" cy="0"/>
+          <a:chOff x="0" y="0"/>
+          <a:chExt cx="0" cy="0"/>
+        </a:xfrm>
+      </p:grpSpPr>
+      <p:sp>
+        <p:nvSpPr>
+          <p:cNvPr id="2" name="Slide Image Placeholder 1"/>
+          <p:cNvSpPr>
+            <a:spLocks noGrp="1" noRot="1" noChangeAspect="1"/>
+          </p:cNvSpPr>
+          <p:nvPr>
+            <p:ph type="sldImg"/>
+          </p:nvPr>
+        </p:nvSpPr>
+        <p:spPr/>
+      </p:sp>
+      <p:sp>
+        <p:nvSpPr>
+          <p:cNvPr id="3" name="Notes Placeholder 2"/>
+          <p:cNvSpPr>
+            <a:spLocks noGrp="1"/>
+          </p:cNvSpPr>
+          <p:nvPr>
+            <p:ph type="body" idx="1"/>
+          </p:nvPr>
+        </p:nvSpPr>
+        <p:spPr/>
+        <p:txBody>
+          <a:bodyPr/>
+          <a:lstStyle/>
+          <a:p>
+            <a:r>
+              <a:rPr lang="en-US" dirty="0" err="1" smtClean="0"/>
+              <a:t>Bfs</a:t>
+            </a:r>
+            <a:r>
+              <a:rPr lang="en-US" dirty="0" smtClean="0"/>
+              <a:t>/</a:t>
+            </a:r>
+            <a:r>
+              <a:rPr lang="en-US" dirty="0" err="1" smtClean="0"/>
+              <a:t>pbfs</a:t>
+            </a:r>
+            <a:r>
+              <a:rPr lang="en-US" dirty="0" smtClean="0"/>
+              <a:t>/</a:t>
+            </a:r>
+            <a:r>
+              <a:rPr lang="en-US" dirty="0" err="1" smtClean="0"/>
+              <a:t>atomicbfs</a:t>
+            </a:r>
+            <a:r>
+              <a:rPr lang="en-US" dirty="0" smtClean="0"/>
+              <a:t> create adjacency list</a:t>
+            </a:r>
+          </a:p>
+          <a:p>
+            <a:r>
+              <a:rPr lang="en-US" dirty="0" smtClean="0"/>
+              <a:t>Boost does too, but it is absurdly big</a:t>
+            </a:r>
+          </a:p>
+          <a:p>
+            <a:r>
+              <a:rPr lang="en-US" dirty="0" err="1" smtClean="0"/>
+              <a:t>Ufind</a:t>
+            </a:r>
+            <a:r>
+              <a:rPr lang="en-US" dirty="0" smtClean="0"/>
+              <a:t> works directly with input, so graph is a bit biased</a:t>
+            </a:r>
+            <a:endParaRPr lang="en-US" dirty="0"/>
+          </a:p>
+        </p:txBody>
+      </p:sp>
+      <p:sp>
+        <p:nvSpPr>
+          <p:cNvPr id="4" name="Slide Number Placeholder 3"/>
+          <p:cNvSpPr>
+            <a:spLocks noGrp="1"/>
+          </p:cNvSpPr>
+          <p:nvPr>
+            <p:ph type="sldNum" sz="quarter" idx="10"/>
+          </p:nvPr>
+        </p:nvSpPr>
+        <p:spPr/>
+        <p:txBody>
+          <a:bodyPr/>
+          <a:lstStyle/>
+          <a:p>
+            <a:fld id="{E9CF5C0B-8884-41E5-88A3-9679438C4701}" type="slidenum">
+              <a:rPr lang="en-US" smtClean="0"/>
+              <a:t>47</a:t>
+            </a:fld>
+            <a:endParaRPr lang="en-US"/>
+          </a:p>
+        </p:txBody>
+      </p:sp>
+    </p:spTree>
+    <p:extLst>
+      <p:ext uri="{BB962C8B-B14F-4D97-AF65-F5344CB8AC3E}">
+        <p14:creationId xmlns:p14="http://schemas.microsoft.com/office/powerpoint/2010/main" val="2654193119"/>
+      </p:ext>
+    </p:extLst>
+  </p:cSld>
+  <p:clrMapOvr>
+    <a:masterClrMapping/>
+  </p:clrMapOvr>
+</p:notes>
+</file>
+
+<file path=ppt/notesSlides/notesSlide14.xml><?xml version="1.0" encoding="utf-8"?>
+<p:notes xmlns:a="http://schemas.openxmlformats.org/drawingml/2006/main" xmlns:r="http://schemas.openxmlformats.org/officeDocument/2006/relationships" xmlns:p="http://schemas.openxmlformats.org/presentationml/2006/main">
+  <p:cSld>
+    <p:spTree>
+      <p:nvGrpSpPr>
+        <p:cNvPr id="1" name=""/>
+        <p:cNvGrpSpPr/>
+        <p:nvPr/>
+      </p:nvGrpSpPr>
+      <p:grpSpPr>
+        <a:xfrm>
+          <a:off x="0" y="0"/>
+          <a:ext cx="0" cy="0"/>
+          <a:chOff x="0" y="0"/>
+          <a:chExt cx="0" cy="0"/>
+        </a:xfrm>
+      </p:grpSpPr>
+      <p:sp>
+        <p:nvSpPr>
+          <p:cNvPr id="2" name="Slide Image Placeholder 1"/>
+          <p:cNvSpPr>
+            <a:spLocks noGrp="1" noRot="1" noChangeAspect="1"/>
+          </p:cNvSpPr>
+          <p:nvPr>
+            <p:ph type="sldImg"/>
+          </p:nvPr>
+        </p:nvSpPr>
+        <p:spPr/>
+      </p:sp>
+      <p:sp>
+        <p:nvSpPr>
+          <p:cNvPr id="3" name="Notes Placeholder 2"/>
+          <p:cNvSpPr>
+            <a:spLocks noGrp="1"/>
+          </p:cNvSpPr>
+          <p:nvPr>
+            <p:ph type="body" idx="1"/>
+          </p:nvPr>
+        </p:nvSpPr>
+        <p:spPr/>
+        <p:txBody>
+          <a:bodyPr/>
+          <a:lstStyle/>
+          <a:p>
+            <a:r>
+              <a:rPr lang="en-US" dirty="0" smtClean="0"/>
+              <a:t>Algorithms</a:t>
+            </a:r>
+            <a:r>
+              <a:rPr lang="en-US" baseline="0" dirty="0" smtClean="0"/>
+              <a:t> that depend more on the number of edges are favored like union find, randomized contraction and parallel randomized contraction.</a:t>
+            </a:r>
+          </a:p>
+          <a:p>
+            <a:r>
+              <a:rPr lang="en-US" baseline="0" dirty="0" smtClean="0"/>
+              <a:t>Other stay stable</a:t>
+            </a:r>
+            <a:endParaRPr lang="en-US" dirty="0"/>
+          </a:p>
+        </p:txBody>
+      </p:sp>
+      <p:sp>
+        <p:nvSpPr>
+          <p:cNvPr id="4" name="Slide Number Placeholder 3"/>
+          <p:cNvSpPr>
+            <a:spLocks noGrp="1"/>
+          </p:cNvSpPr>
+          <p:nvPr>
+            <p:ph type="sldNum" sz="quarter" idx="10"/>
+          </p:nvPr>
+        </p:nvSpPr>
+        <p:spPr/>
+        <p:txBody>
+          <a:bodyPr/>
+          <a:lstStyle/>
+          <a:p>
+            <a:fld id="{E9CF5C0B-8884-41E5-88A3-9679438C4701}" type="slidenum">
+              <a:rPr lang="en-US" smtClean="0"/>
+              <a:t>48</a:t>
+            </a:fld>
+            <a:endParaRPr lang="en-US"/>
+          </a:p>
+        </p:txBody>
+      </p:sp>
+    </p:spTree>
+    <p:extLst>
+      <p:ext uri="{BB962C8B-B14F-4D97-AF65-F5344CB8AC3E}">
+        <p14:creationId xmlns:p14="http://schemas.microsoft.com/office/powerpoint/2010/main" val="3842314471"/>
+      </p:ext>
+    </p:extLst>
+  </p:cSld>
+  <p:clrMapOvr>
+    <a:masterClrMapping/>
+  </p:clrMapOvr>
+</p:notes>
+</file>
+
+<file path=ppt/notesSlides/notesSlide15.xml><?xml version="1.0" encoding="utf-8"?>
+<p:notes xmlns:a="http://schemas.openxmlformats.org/drawingml/2006/main" xmlns:r="http://schemas.openxmlformats.org/officeDocument/2006/relationships" xmlns:p="http://schemas.openxmlformats.org/presentationml/2006/main">
+  <p:cSld>
+    <p:spTree>
+      <p:nvGrpSpPr>
+        <p:cNvPr id="1" name=""/>
+        <p:cNvGrpSpPr/>
+        <p:nvPr/>
+      </p:nvGrpSpPr>
+      <p:grpSpPr>
+        <a:xfrm>
+          <a:off x="0" y="0"/>
+          <a:ext cx="0" cy="0"/>
+          <a:chOff x="0" y="0"/>
+          <a:chExt cx="0" cy="0"/>
+        </a:xfrm>
+      </p:grpSpPr>
+      <p:sp>
+        <p:nvSpPr>
+          <p:cNvPr id="2" name="Slide Image Placeholder 1"/>
+          <p:cNvSpPr>
+            <a:spLocks noGrp="1" noRot="1" noChangeAspect="1"/>
+          </p:cNvSpPr>
+          <p:nvPr>
+            <p:ph type="sldImg"/>
+          </p:nvPr>
+        </p:nvSpPr>
+        <p:spPr/>
+      </p:sp>
+      <p:sp>
+        <p:nvSpPr>
+          <p:cNvPr id="3" name="Notes Placeholder 2"/>
+          <p:cNvSpPr>
+            <a:spLocks noGrp="1"/>
+          </p:cNvSpPr>
+          <p:nvPr>
+            <p:ph type="body" idx="1"/>
+          </p:nvPr>
+        </p:nvSpPr>
+        <p:spPr/>
+        <p:txBody>
+          <a:bodyPr/>
+          <a:lstStyle/>
+          <a:p>
+            <a:r>
+              <a:rPr lang="en-US" dirty="0" smtClean="0"/>
+              <a:t>Serial </a:t>
+            </a:r>
+            <a:r>
+              <a:rPr lang="en-US" dirty="0" err="1" smtClean="0"/>
+              <a:t>algos</a:t>
+            </a:r>
+            <a:r>
+              <a:rPr lang="en-US" dirty="0" smtClean="0"/>
+              <a:t> shown as straight lines</a:t>
+            </a:r>
+          </a:p>
+          <a:p>
+            <a:r>
+              <a:rPr lang="en-US" dirty="0" smtClean="0"/>
+              <a:t>Runtime</a:t>
+            </a:r>
+            <a:r>
+              <a:rPr lang="en-US" baseline="0" dirty="0" smtClean="0"/>
+              <a:t> is best at around 30-40 cores</a:t>
+            </a:r>
+            <a:endParaRPr lang="en-US" dirty="0" smtClean="0"/>
+          </a:p>
+          <a:p>
+            <a:endParaRPr lang="en-US" dirty="0"/>
+          </a:p>
+        </p:txBody>
+      </p:sp>
+      <p:sp>
+        <p:nvSpPr>
+          <p:cNvPr id="4" name="Slide Number Placeholder 3"/>
+          <p:cNvSpPr>
+            <a:spLocks noGrp="1"/>
+          </p:cNvSpPr>
+          <p:nvPr>
+            <p:ph type="sldNum" sz="quarter" idx="10"/>
+          </p:nvPr>
+        </p:nvSpPr>
+        <p:spPr/>
+        <p:txBody>
+          <a:bodyPr/>
+          <a:lstStyle/>
+          <a:p>
+            <a:fld id="{E9CF5C0B-8884-41E5-88A3-9679438C4701}" type="slidenum">
+              <a:rPr lang="en-US" smtClean="0"/>
+              <a:t>49</a:t>
+            </a:fld>
+            <a:endParaRPr lang="en-US"/>
+          </a:p>
+        </p:txBody>
+      </p:sp>
+    </p:spTree>
+    <p:extLst>
+      <p:ext uri="{BB962C8B-B14F-4D97-AF65-F5344CB8AC3E}">
+        <p14:creationId xmlns:p14="http://schemas.microsoft.com/office/powerpoint/2010/main" val="1869037759"/>
+      </p:ext>
+    </p:extLst>
+  </p:cSld>
+  <p:clrMapOvr>
+    <a:masterClrMapping/>
+  </p:clrMapOvr>
+</p:notes>
+</file>
+
+<file path=ppt/notesSlides/notesSlide16.xml><?xml version="1.0" encoding="utf-8"?>
+<p:notes xmlns:a="http://schemas.openxmlformats.org/drawingml/2006/main" xmlns:r="http://schemas.openxmlformats.org/officeDocument/2006/relationships" xmlns:p="http://schemas.openxmlformats.org/presentationml/2006/main">
+  <p:cSld>
+    <p:spTree>
+      <p:nvGrpSpPr>
+        <p:cNvPr id="1" name=""/>
+        <p:cNvGrpSpPr/>
+        <p:nvPr/>
+      </p:nvGrpSpPr>
+      <p:grpSpPr>
+        <a:xfrm>
+          <a:off x="0" y="0"/>
+          <a:ext cx="0" cy="0"/>
+          <a:chOff x="0" y="0"/>
+          <a:chExt cx="0" cy="0"/>
+        </a:xfrm>
+      </p:grpSpPr>
+      <p:sp>
+        <p:nvSpPr>
+          <p:cNvPr id="2" name="Slide Image Placeholder 1"/>
+          <p:cNvSpPr>
+            <a:spLocks noGrp="1" noRot="1" noChangeAspect="1"/>
+          </p:cNvSpPr>
+          <p:nvPr>
+            <p:ph type="sldImg"/>
+          </p:nvPr>
+        </p:nvSpPr>
+        <p:spPr/>
+      </p:sp>
+      <p:sp>
+        <p:nvSpPr>
+          <p:cNvPr id="3" name="Notes Placeholder 2"/>
+          <p:cNvSpPr>
+            <a:spLocks noGrp="1"/>
+          </p:cNvSpPr>
+          <p:nvPr>
+            <p:ph type="body" idx="1"/>
+          </p:nvPr>
+        </p:nvSpPr>
+        <p:spPr/>
+        <p:txBody>
+          <a:bodyPr/>
+          <a:lstStyle/>
+          <a:p>
+            <a:r>
+              <a:rPr lang="en-US" dirty="0" smtClean="0"/>
+              <a:t>Program developed to convert</a:t>
+            </a:r>
+            <a:r>
+              <a:rPr lang="en-US" baseline="0" dirty="0" smtClean="0"/>
+              <a:t> .</a:t>
+            </a:r>
+            <a:r>
+              <a:rPr lang="en-US" baseline="0" dirty="0" err="1" smtClean="0"/>
+              <a:t>obj</a:t>
+            </a:r>
+            <a:r>
+              <a:rPr lang="en-US" baseline="0" dirty="0" smtClean="0"/>
+              <a:t> files</a:t>
+            </a:r>
+            <a:endParaRPr lang="en-US" dirty="0" smtClean="0"/>
+          </a:p>
+          <a:p>
+            <a:r>
+              <a:rPr lang="en-US" dirty="0" smtClean="0"/>
+              <a:t>Number</a:t>
+            </a:r>
+            <a:r>
+              <a:rPr lang="en-US" baseline="0" dirty="0" smtClean="0"/>
+              <a:t> components checked with program called trimesh2, programming used for processing meshes</a:t>
+            </a:r>
+            <a:endParaRPr lang="en-US" dirty="0"/>
+          </a:p>
+        </p:txBody>
+      </p:sp>
+      <p:sp>
+        <p:nvSpPr>
+          <p:cNvPr id="4" name="Slide Number Placeholder 3"/>
+          <p:cNvSpPr>
+            <a:spLocks noGrp="1"/>
+          </p:cNvSpPr>
+          <p:nvPr>
+            <p:ph type="sldNum" sz="quarter" idx="10"/>
+          </p:nvPr>
+        </p:nvSpPr>
+        <p:spPr/>
+        <p:txBody>
+          <a:bodyPr/>
+          <a:lstStyle/>
+          <a:p>
+            <a:fld id="{E9CF5C0B-8884-41E5-88A3-9679438C4701}" type="slidenum">
+              <a:rPr lang="en-US" smtClean="0"/>
               <a:t>50</a:t>
             </a:fld>
             <a:endParaRPr lang="en-US"/>
@@ -18306,7 +18935,7 @@
 </p:notes>
 </file>
 
-<file path=ppt/notesSlides/notesSlide11.xml><?xml version="1.0" encoding="utf-8"?>
+<file path=ppt/notesSlides/notesSlide17.xml><?xml version="1.0" encoding="utf-8"?>
 <p:notes xmlns:a="http://schemas.openxmlformats.org/drawingml/2006/main" xmlns:r="http://schemas.openxmlformats.org/officeDocument/2006/relationships" xmlns:p="http://schemas.openxmlformats.org/presentationml/2006/main">
   <p:cSld>
     <p:spTree>
@@ -18966,46 +19595,13 @@
           <a:lstStyle/>
           <a:p>
             <a:r>
-              <a:rPr lang="en-US" dirty="0" err="1" smtClean="0"/>
-              <a:t>Bfs</a:t>
+              <a:rPr lang="en-US" dirty="0" smtClean="0"/>
+              <a:t>Every</a:t>
             </a:r>
             <a:r>
-              <a:rPr lang="en-US" dirty="0" smtClean="0"/>
-              <a:t>/</a:t>
+              <a:rPr lang="en-US" baseline="0" dirty="0" smtClean="0"/>
+              <a:t> edge between blue to pink is contracted.</a:t>
             </a:r>
-            <a:r>
-              <a:rPr lang="en-US" dirty="0" err="1" smtClean="0"/>
-              <a:t>pbfs</a:t>
-            </a:r>
-            <a:r>
-              <a:rPr lang="en-US" dirty="0" smtClean="0"/>
-              <a:t>/</a:t>
-            </a:r>
-            <a:r>
-              <a:rPr lang="en-US" dirty="0" err="1" smtClean="0"/>
-              <a:t>atomicbfs</a:t>
-            </a:r>
-            <a:r>
-              <a:rPr lang="en-US" dirty="0" smtClean="0"/>
-              <a:t> create adjacency list</a:t>
-            </a:r>
-          </a:p>
-          <a:p>
-            <a:r>
-              <a:rPr lang="en-US" dirty="0" smtClean="0"/>
-              <a:t>Boost does too, but it is absurdly big</a:t>
-            </a:r>
-          </a:p>
-          <a:p>
-            <a:r>
-              <a:rPr lang="en-US" dirty="0" err="1" smtClean="0"/>
-              <a:t>Ufind</a:t>
-            </a:r>
-            <a:r>
-              <a:rPr lang="en-US" dirty="0" smtClean="0"/>
-              <a:t> works directly with input</a:t>
-            </a:r>
-            <a:endParaRPr lang="en-US" dirty="0"/>
           </a:p>
         </p:txBody>
       </p:sp>
@@ -19026,7 +19622,7 @@
           <a:p>
             <a:fld id="{E9CF5C0B-8884-41E5-88A3-9679438C4701}" type="slidenum">
               <a:rPr lang="en-US" smtClean="0"/>
-              <a:t>47</a:t>
+              <a:t>25</a:t>
             </a:fld>
             <a:endParaRPr lang="en-US"/>
           </a:p>
@@ -19035,7 +19631,7 @@
     </p:spTree>
     <p:extLst>
       <p:ext uri="{BB962C8B-B14F-4D97-AF65-F5344CB8AC3E}">
-        <p14:creationId xmlns:p14="http://schemas.microsoft.com/office/powerpoint/2010/main" val="2654193119"/>
+        <p14:creationId xmlns:p14="http://schemas.microsoft.com/office/powerpoint/2010/main" val="4189202505"/>
       </p:ext>
     </p:extLst>
   </p:cSld>
@@ -19091,18 +19687,18 @@
           <a:p>
             <a:r>
               <a:rPr lang="en-US" dirty="0" smtClean="0"/>
-              <a:t>Serial </a:t>
+              <a:t>Parallel</a:t>
             </a:r>
             <a:r>
-              <a:rPr lang="en-US" dirty="0" err="1" smtClean="0"/>
-              <a:t>algos</a:t>
+              <a:rPr lang="en-US" baseline="0" dirty="0" smtClean="0"/>
+              <a:t> version, simply splits edges and vertices to each thread</a:t>
             </a:r>
+          </a:p>
+          <a:p>
             <a:r>
-              <a:rPr lang="en-US" dirty="0" smtClean="0"/>
-              <a:t> shown as straight lines</a:t>
+              <a:rPr lang="en-US" baseline="0" dirty="0" smtClean="0"/>
+              <a:t>Does not perform well. Simply does more operations and is not linear time</a:t>
             </a:r>
-          </a:p>
-          <a:p>
             <a:endParaRPr lang="en-US" dirty="0"/>
           </a:p>
         </p:txBody>
@@ -19124,7 +19720,7 @@
           <a:p>
             <a:fld id="{E9CF5C0B-8884-41E5-88A3-9679438C4701}" type="slidenum">
               <a:rPr lang="en-US" smtClean="0"/>
-              <a:t>49</a:t>
+              <a:t>29</a:t>
             </a:fld>
             <a:endParaRPr lang="en-US"/>
           </a:p>
@@ -19133,7 +19729,7 @@
     </p:spTree>
     <p:extLst>
       <p:ext uri="{BB962C8B-B14F-4D97-AF65-F5344CB8AC3E}">
-        <p14:creationId xmlns:p14="http://schemas.microsoft.com/office/powerpoint/2010/main" val="1869037759"/>
+        <p14:creationId xmlns:p14="http://schemas.microsoft.com/office/powerpoint/2010/main" val="1778262230"/>
       </p:ext>
     </p:extLst>
   </p:cSld>
@@ -26948,8 +27544,13 @@
           <a:p>
             <a:r>
               <a:rPr lang="en-US" dirty="0"/>
-              <a:t>Serial transversal</a:t>
+              <a:t>Serial </a:t>
             </a:r>
+            <a:r>
+              <a:rPr lang="en-US" dirty="0" smtClean="0"/>
+              <a:t>traversal</a:t>
+            </a:r>
+            <a:endParaRPr lang="en-US" dirty="0"/>
           </a:p>
         </p:txBody>
       </p:sp>
@@ -28016,8 +28617,13 @@
           <a:p>
             <a:r>
               <a:rPr lang="en-US" dirty="0"/>
-              <a:t>Serial transversal</a:t>
+              <a:t>Serial </a:t>
             </a:r>
+            <a:r>
+              <a:rPr lang="en-US" dirty="0" smtClean="0"/>
+              <a:t>traversal</a:t>
+            </a:r>
+            <a:endParaRPr lang="en-US" dirty="0"/>
           </a:p>
         </p:txBody>
       </p:sp>
@@ -29087,7 +29693,7 @@
           <a:p>
             <a:r>
               <a:rPr lang="en-US" dirty="0" smtClean="0"/>
-              <a:t>Serial transversal</a:t>
+              <a:t>Serial traversal</a:t>
             </a:r>
             <a:endParaRPr lang="en-US" dirty="0"/>
           </a:p>
@@ -31256,7 +31862,11 @@
           <a:p>
             <a:r>
               <a:rPr lang="de-DE" dirty="0"/>
-              <a:t>Parallel spanning treeTree</a:t>
+              <a:t>Parallel spanning </a:t>
+            </a:r>
+            <a:r>
+              <a:rPr lang="de-DE" dirty="0" smtClean="0"/>
+              <a:t>tree</a:t>
             </a:r>
             <a:endParaRPr lang="de-DE" dirty="0"/>
           </a:p>
@@ -31695,7 +32305,7 @@
           <a:p>
             <a:r>
               <a:rPr lang="en-US" dirty="0" smtClean="0"/>
-              <a:t>Randomized Contraction</a:t>
+              <a:t>Randomized contraction</a:t>
             </a:r>
             <a:endParaRPr lang="en-US" dirty="0"/>
           </a:p>
@@ -31716,7 +32326,7 @@
           <a:bodyPr/>
           <a:lstStyle/>
           <a:p>
-            <a:endParaRPr lang="en-US"/>
+            <a:endParaRPr lang="en-US" dirty="0"/>
           </a:p>
         </p:txBody>
       </p:sp>
@@ -31736,7 +32346,7 @@
         </p:blipFill>
         <p:spPr>
           <a:xfrm>
-            <a:off x="2085975" y="2286000"/>
+            <a:off x="2085975" y="2907806"/>
             <a:ext cx="8020050" cy="1228725"/>
           </a:xfrm>
           <a:prstGeom prst="rect">
@@ -31744,6 +32354,49 @@
           </a:prstGeom>
         </p:spPr>
       </p:pic>
+      <p:sp>
+        <p:nvSpPr>
+          <p:cNvPr id="6" name="TextBox 5"/>
+          <p:cNvSpPr txBox="1"/>
+          <p:nvPr/>
+        </p:nvSpPr>
+        <p:spPr>
+          <a:xfrm>
+            <a:off x="6670964" y="6530037"/>
+            <a:ext cx="5586786" cy="246221"/>
+          </a:xfrm>
+          <a:prstGeom prst="rect">
+            <a:avLst/>
+          </a:prstGeom>
+          <a:noFill/>
+        </p:spPr>
+        <p:txBody>
+          <a:bodyPr wrap="none" rtlCol="0">
+            <a:spAutoFit/>
+          </a:bodyPr>
+          <a:lstStyle/>
+          <a:p>
+            <a:pPr marL="0" lvl="1"/>
+            <a:r>
+              <a:rPr lang="en-US" sz="1000" dirty="0"/>
+              <a:t>s</a:t>
+            </a:r>
+            <a:r>
+              <a:rPr lang="en-US" sz="1000" dirty="0" smtClean="0"/>
+              <a:t>ource: </a:t>
+            </a:r>
+            <a:r>
+              <a:rPr lang="en-US" sz="1000" dirty="0"/>
+              <a:t>http://www3.cs.stonybrook.edu/~</a:t>
+            </a:r>
+            <a:r>
+              <a:rPr lang="en-US" sz="1000" dirty="0" smtClean="0"/>
+              <a:t>rezaul/Spring-2012/CSE613/CSE613-lecture-11.pdf</a:t>
+            </a:r>
+            <a:endParaRPr lang="en-US" sz="1000" dirty="0"/>
+          </a:p>
+        </p:txBody>
+      </p:sp>
     </p:spTree>
     <p:extLst>
       <p:ext uri="{BB962C8B-B14F-4D97-AF65-F5344CB8AC3E}">
@@ -31798,7 +32451,7 @@
           <a:p>
             <a:r>
               <a:rPr lang="en-US" dirty="0" smtClean="0"/>
-              <a:t>Randomized Contraction</a:t>
+              <a:t>Randomized contraction</a:t>
             </a:r>
             <a:endParaRPr lang="en-US" dirty="0"/>
           </a:p>
@@ -31819,6 +32472,10 @@
           <a:bodyPr/>
           <a:lstStyle/>
           <a:p>
+            <a:r>
+              <a:rPr lang="en-US" dirty="0" smtClean="0"/>
+              <a:t>Each vertex is given a random color (pink / light blue)</a:t>
+            </a:r>
             <a:endParaRPr lang="en-US" dirty="0"/>
           </a:p>
         </p:txBody>
@@ -31832,14 +32489,14 @@
           <p:nvPr/>
         </p:nvPicPr>
         <p:blipFill>
-          <a:blip r:embed="rId2"/>
+          <a:blip r:embed="rId3"/>
           <a:stretch>
             <a:fillRect/>
           </a:stretch>
         </p:blipFill>
         <p:spPr>
           <a:xfrm>
-            <a:off x="2133409" y="2209228"/>
+            <a:off x="2133409" y="2832683"/>
             <a:ext cx="8010525" cy="1476375"/>
           </a:xfrm>
           <a:prstGeom prst="rect">
@@ -31847,6 +32504,49 @@
           </a:prstGeom>
         </p:spPr>
       </p:pic>
+      <p:sp>
+        <p:nvSpPr>
+          <p:cNvPr id="7" name="TextBox 6"/>
+          <p:cNvSpPr txBox="1"/>
+          <p:nvPr/>
+        </p:nvSpPr>
+        <p:spPr>
+          <a:xfrm>
+            <a:off x="6670964" y="6530037"/>
+            <a:ext cx="5586786" cy="246221"/>
+          </a:xfrm>
+          <a:prstGeom prst="rect">
+            <a:avLst/>
+          </a:prstGeom>
+          <a:noFill/>
+        </p:spPr>
+        <p:txBody>
+          <a:bodyPr wrap="none" rtlCol="0">
+            <a:spAutoFit/>
+          </a:bodyPr>
+          <a:lstStyle/>
+          <a:p>
+            <a:pPr marL="0" lvl="1"/>
+            <a:r>
+              <a:rPr lang="en-US" sz="1000" dirty="0"/>
+              <a:t>s</a:t>
+            </a:r>
+            <a:r>
+              <a:rPr lang="en-US" sz="1000" dirty="0" smtClean="0"/>
+              <a:t>ource: </a:t>
+            </a:r>
+            <a:r>
+              <a:rPr lang="en-US" sz="1000" dirty="0"/>
+              <a:t>http://www3.cs.stonybrook.edu/~</a:t>
+            </a:r>
+            <a:r>
+              <a:rPr lang="en-US" sz="1000" dirty="0" smtClean="0"/>
+              <a:t>rezaul/Spring-2012/CSE613/CSE613-lecture-11.pdf</a:t>
+            </a:r>
+            <a:endParaRPr lang="en-US" sz="1000" dirty="0"/>
+          </a:p>
+        </p:txBody>
+      </p:sp>
     </p:spTree>
     <p:extLst>
       <p:ext uri="{BB962C8B-B14F-4D97-AF65-F5344CB8AC3E}">
@@ -31901,7 +32601,7 @@
           <a:p>
             <a:r>
               <a:rPr lang="en-US" dirty="0" smtClean="0"/>
-              <a:t>Randomized Contraction</a:t>
+              <a:t>Randomized contraction</a:t>
             </a:r>
             <a:endParaRPr lang="en-US" dirty="0"/>
           </a:p>
@@ -31922,6 +32622,10 @@
           <a:bodyPr/>
           <a:lstStyle/>
           <a:p>
+            <a:r>
+              <a:rPr lang="en-US" dirty="0" smtClean="0"/>
+              <a:t>Each contraction leads to less edges</a:t>
+            </a:r>
             <a:endParaRPr lang="en-US" dirty="0"/>
           </a:p>
         </p:txBody>
@@ -31942,7 +32646,7 @@
         </p:blipFill>
         <p:spPr>
           <a:xfrm>
-            <a:off x="1849581" y="2189449"/>
+            <a:off x="1849581" y="2855418"/>
             <a:ext cx="8534400" cy="2562225"/>
           </a:xfrm>
           <a:prstGeom prst="rect">
@@ -31950,6 +32654,49 @@
           </a:prstGeom>
         </p:spPr>
       </p:pic>
+      <p:sp>
+        <p:nvSpPr>
+          <p:cNvPr id="6" name="TextBox 5"/>
+          <p:cNvSpPr txBox="1"/>
+          <p:nvPr/>
+        </p:nvSpPr>
+        <p:spPr>
+          <a:xfrm>
+            <a:off x="6670964" y="6530037"/>
+            <a:ext cx="5586786" cy="246221"/>
+          </a:xfrm>
+          <a:prstGeom prst="rect">
+            <a:avLst/>
+          </a:prstGeom>
+          <a:noFill/>
+        </p:spPr>
+        <p:txBody>
+          <a:bodyPr wrap="none" rtlCol="0">
+            <a:spAutoFit/>
+          </a:bodyPr>
+          <a:lstStyle/>
+          <a:p>
+            <a:pPr marL="0" lvl="1"/>
+            <a:r>
+              <a:rPr lang="en-US" sz="1000" dirty="0"/>
+              <a:t>s</a:t>
+            </a:r>
+            <a:r>
+              <a:rPr lang="en-US" sz="1000" dirty="0" smtClean="0"/>
+              <a:t>ource: </a:t>
+            </a:r>
+            <a:r>
+              <a:rPr lang="en-US" sz="1000" dirty="0"/>
+              <a:t>http://www3.cs.stonybrook.edu/~</a:t>
+            </a:r>
+            <a:r>
+              <a:rPr lang="en-US" sz="1000" dirty="0" smtClean="0"/>
+              <a:t>rezaul/Spring-2012/CSE613/CSE613-lecture-11.pdf</a:t>
+            </a:r>
+            <a:endParaRPr lang="en-US" sz="1000" dirty="0"/>
+          </a:p>
+        </p:txBody>
+      </p:sp>
     </p:spTree>
     <p:extLst>
       <p:ext uri="{BB962C8B-B14F-4D97-AF65-F5344CB8AC3E}">
@@ -32003,7 +32750,7 @@
         </p:blipFill>
         <p:spPr>
           <a:xfrm>
-            <a:off x="1782472" y="2189449"/>
+            <a:off x="1782472" y="2813858"/>
             <a:ext cx="8696325" cy="3962400"/>
           </a:xfrm>
           <a:prstGeom prst="rect">
@@ -32028,7 +32775,7 @@
           <a:p>
             <a:r>
               <a:rPr lang="en-US" dirty="0" smtClean="0"/>
-              <a:t>Randomized Contraction</a:t>
+              <a:t>Randomized contraction</a:t>
             </a:r>
             <a:endParaRPr lang="en-US" dirty="0"/>
           </a:p>
@@ -32049,7 +32796,54 @@
           <a:bodyPr/>
           <a:lstStyle/>
           <a:p>
+            <a:r>
+              <a:rPr lang="en-US" dirty="0" smtClean="0"/>
+              <a:t>Contract until no edges are left</a:t>
+            </a:r>
             <a:endParaRPr lang="en-US" dirty="0"/>
+          </a:p>
+        </p:txBody>
+      </p:sp>
+      <p:sp>
+        <p:nvSpPr>
+          <p:cNvPr id="6" name="TextBox 5"/>
+          <p:cNvSpPr txBox="1"/>
+          <p:nvPr/>
+        </p:nvSpPr>
+        <p:spPr>
+          <a:xfrm>
+            <a:off x="6670964" y="6530037"/>
+            <a:ext cx="5586786" cy="246221"/>
+          </a:xfrm>
+          <a:prstGeom prst="rect">
+            <a:avLst/>
+          </a:prstGeom>
+          <a:noFill/>
+        </p:spPr>
+        <p:txBody>
+          <a:bodyPr wrap="none" rtlCol="0">
+            <a:spAutoFit/>
+          </a:bodyPr>
+          <a:lstStyle/>
+          <a:p>
+            <a:pPr marL="0" lvl="1"/>
+            <a:r>
+              <a:rPr lang="en-US" sz="1000" dirty="0"/>
+              <a:t>s</a:t>
+            </a:r>
+            <a:r>
+              <a:rPr lang="en-US" sz="1000" dirty="0" smtClean="0"/>
+              <a:t>ource: </a:t>
+            </a:r>
+            <a:r>
+              <a:rPr lang="en-US" sz="1000" dirty="0"/>
+              <a:t>http://www3.cs.stonybrook.edu/~</a:t>
+            </a:r>
+            <a:r>
+              <a:rPr lang="en-US" sz="1000" dirty="0" smtClean="0"/>
+              <a:t>rezaul/Spring-2012/CSE613/CSE613-lecture-11.pdf</a:t>
+            </a:r>
+            <a:endParaRPr lang="en-US" sz="1000" dirty="0"/>
           </a:p>
         </p:txBody>
       </p:sp>
@@ -32107,7 +32901,7 @@
           <a:p>
             <a:r>
               <a:rPr lang="en-US" dirty="0" smtClean="0"/>
-              <a:t>Randomized Contraction</a:t>
+              <a:t>Randomized contraction</a:t>
             </a:r>
             <a:endParaRPr lang="en-US" dirty="0"/>
           </a:p>
@@ -32128,6 +32922,10 @@
           <a:bodyPr/>
           <a:lstStyle/>
           <a:p>
+            <a:r>
+              <a:rPr lang="en-US" dirty="0" smtClean="0"/>
+              <a:t>Reverse the path to find the vertices component number</a:t>
+            </a:r>
             <a:endParaRPr lang="en-US" dirty="0"/>
           </a:p>
         </p:txBody>
@@ -32156,6 +32954,49 @@
           </a:prstGeom>
         </p:spPr>
       </p:pic>
+      <p:sp>
+        <p:nvSpPr>
+          <p:cNvPr id="6" name="TextBox 5"/>
+          <p:cNvSpPr txBox="1"/>
+          <p:nvPr/>
+        </p:nvSpPr>
+        <p:spPr>
+          <a:xfrm>
+            <a:off x="6670964" y="6530037"/>
+            <a:ext cx="5586786" cy="246221"/>
+          </a:xfrm>
+          <a:prstGeom prst="rect">
+            <a:avLst/>
+          </a:prstGeom>
+          <a:noFill/>
+        </p:spPr>
+        <p:txBody>
+          <a:bodyPr wrap="none" rtlCol="0">
+            <a:spAutoFit/>
+          </a:bodyPr>
+          <a:lstStyle/>
+          <a:p>
+            <a:pPr marL="0" lvl="1"/>
+            <a:r>
+              <a:rPr lang="en-US" sz="1000" dirty="0"/>
+              <a:t>s</a:t>
+            </a:r>
+            <a:r>
+              <a:rPr lang="en-US" sz="1000" dirty="0" smtClean="0"/>
+              <a:t>ource: </a:t>
+            </a:r>
+            <a:r>
+              <a:rPr lang="en-US" sz="1000" dirty="0"/>
+              <a:t>http://www3.cs.stonybrook.edu/~</a:t>
+            </a:r>
+            <a:r>
+              <a:rPr lang="en-US" sz="1000" dirty="0" smtClean="0"/>
+              <a:t>rezaul/Spring-2012/CSE613/CSE613-lecture-11.pdf</a:t>
+            </a:r>
+            <a:endParaRPr lang="en-US" sz="1000" dirty="0"/>
+          </a:p>
+        </p:txBody>
+      </p:sp>
     </p:spTree>
     <p:extLst>
       <p:ext uri="{BB962C8B-B14F-4D97-AF65-F5344CB8AC3E}">
@@ -32210,7 +33051,7 @@
           <a:p>
             <a:r>
               <a:rPr lang="en-US" dirty="0" smtClean="0"/>
-              <a:t>Randomized Contraction</a:t>
+              <a:t>Randomized contraction</a:t>
             </a:r>
             <a:endParaRPr lang="en-US" dirty="0"/>
           </a:p>
@@ -32255,7 +33096,7 @@
         </p:xfrm>
         <a:graphic>
           <a:graphicData uri="http://schemas.openxmlformats.org/drawingml/2006/chart">
-            <c:chart xmlns:c="http://schemas.openxmlformats.org/drawingml/2006/chart" xmlns:r="http://schemas.openxmlformats.org/officeDocument/2006/relationships" r:id="rId2"/>
+            <c:chart xmlns:c="http://schemas.openxmlformats.org/drawingml/2006/chart" xmlns:r="http://schemas.openxmlformats.org/officeDocument/2006/relationships" r:id="rId3"/>
           </a:graphicData>
         </a:graphic>
       </p:graphicFrame>
@@ -33601,7 +34442,7 @@
           <a:p>
             <a:r>
               <a:rPr lang="en-US" dirty="0" smtClean="0"/>
-              <a:t>Parallel transversal</a:t>
+              <a:t>Parallel traversal</a:t>
             </a:r>
             <a:endParaRPr lang="en-US" dirty="0"/>
           </a:p>
@@ -33680,7 +34521,7 @@
           <a:p>
             <a:r>
               <a:rPr lang="en-US" dirty="0" smtClean="0"/>
-              <a:t>Parallel transversal</a:t>
+              <a:t>Parallel traversal</a:t>
             </a:r>
             <a:endParaRPr lang="en-US" dirty="0"/>
           </a:p>
@@ -34711,7 +35552,7 @@
           <a:p>
             <a:r>
               <a:rPr lang="en-US" dirty="0" smtClean="0"/>
-              <a:t>Parallel transversal</a:t>
+              <a:t>Parallel traversal</a:t>
             </a:r>
             <a:endParaRPr lang="en-US" dirty="0"/>
           </a:p>
@@ -35744,7 +36585,7 @@
           <a:p>
             <a:r>
               <a:rPr lang="en-US" dirty="0" smtClean="0"/>
-              <a:t>Parallel transversal</a:t>
+              <a:t>Parallel traversal</a:t>
             </a:r>
             <a:endParaRPr lang="en-US" dirty="0"/>
           </a:p>
@@ -36790,7 +37631,7 @@
           <a:p>
             <a:r>
               <a:rPr lang="en-US" dirty="0" smtClean="0"/>
-              <a:t>Parallel transversal</a:t>
+              <a:t>Parallel traversal</a:t>
             </a:r>
             <a:endParaRPr lang="en-US" dirty="0"/>
           </a:p>
@@ -37830,7 +38671,7 @@
           <a:p>
             <a:r>
               <a:rPr lang="en-US" dirty="0" smtClean="0"/>
-              <a:t>Parallel transversal</a:t>
+              <a:t>Parallel traversal</a:t>
             </a:r>
             <a:endParaRPr lang="en-US" dirty="0"/>
           </a:p>
@@ -38034,7 +38875,7 @@
           <a:p>
             <a:r>
               <a:rPr lang="en-US" dirty="0" smtClean="0"/>
-              <a:t>Parallel transversal</a:t>
+              <a:t>Parallel traversal</a:t>
             </a:r>
             <a:endParaRPr lang="en-US" dirty="0"/>
           </a:p>
@@ -38478,7 +39319,7 @@
           <a:p>
             <a:r>
               <a:rPr lang="en-US" dirty="0" smtClean="0"/>
-              <a:t>Parallel transversal</a:t>
+              <a:t>Parallel traversal</a:t>
             </a:r>
             <a:endParaRPr lang="en-US" dirty="0"/>
           </a:p>
@@ -38775,7 +39616,7 @@
             <a:avLst/>
           </a:prstGeom>
           <a:solidFill>
-            <a:srgbClr val="FFFF00"/>
+            <a:srgbClr val="00B050"/>
           </a:solidFill>
         </p:spPr>
         <p:style>
@@ -39074,7 +39915,7 @@
           <a:p>
             <a:r>
               <a:rPr lang="en-US" dirty="0" smtClean="0"/>
-              <a:t>Parallel transversal</a:t>
+              <a:t>Parallel traversal</a:t>
             </a:r>
             <a:endParaRPr lang="en-US" dirty="0"/>
           </a:p>
@@ -39401,7 +40242,7 @@
             <a:avLst/>
           </a:prstGeom>
           <a:solidFill>
-            <a:srgbClr val="FFFF00"/>
+            <a:srgbClr val="00B050"/>
           </a:solidFill>
         </p:spPr>
         <p:style>
@@ -39480,7 +40321,7 @@
             <a:avLst/>
           </a:prstGeom>
           <a:solidFill>
-            <a:srgbClr val="FFFF00"/>
+            <a:srgbClr val="00B050"/>
           </a:solidFill>
         </p:spPr>
         <p:style>
@@ -39523,7 +40364,7 @@
             <a:avLst/>
           </a:prstGeom>
           <a:solidFill>
-            <a:srgbClr val="FFFF00"/>
+            <a:srgbClr val="00B050"/>
           </a:solidFill>
         </p:spPr>
         <p:style>
@@ -39822,7 +40663,7 @@
           <a:p>
             <a:r>
               <a:rPr lang="en-US" dirty="0" smtClean="0"/>
-              <a:t>Parallel transversal</a:t>
+              <a:t>Parallel traversal</a:t>
             </a:r>
             <a:endParaRPr lang="en-US" dirty="0"/>
           </a:p>
@@ -40149,7 +40990,7 @@
             <a:avLst/>
           </a:prstGeom>
           <a:solidFill>
-            <a:srgbClr val="FFFF00"/>
+            <a:srgbClr val="00B050"/>
           </a:solidFill>
         </p:spPr>
         <p:style>
@@ -40228,7 +41069,7 @@
             <a:avLst/>
           </a:prstGeom>
           <a:solidFill>
-            <a:srgbClr val="FFFF00"/>
+            <a:srgbClr val="00B050"/>
           </a:solidFill>
         </p:spPr>
         <p:style>
@@ -40271,7 +41112,7 @@
             <a:avLst/>
           </a:prstGeom>
           <a:solidFill>
-            <a:srgbClr val="FFFF00"/>
+            <a:srgbClr val="00B050"/>
           </a:solidFill>
         </p:spPr>
         <p:style>
@@ -40591,7 +41432,7 @@
             <a:avLst/>
           </a:prstGeom>
           <a:solidFill>
-            <a:srgbClr val="00B050"/>
+            <a:srgbClr val="FFFF00"/>
           </a:solidFill>
         </p:spPr>
         <p:style>
@@ -40713,7 +41554,7 @@
             <a:avLst/>
           </a:prstGeom>
           <a:solidFill>
-            <a:srgbClr val="00B050"/>
+            <a:srgbClr val="FFFF00"/>
           </a:solidFill>
         </p:spPr>
         <p:style>
@@ -40756,7 +41597,7 @@
             <a:avLst/>
           </a:prstGeom>
           <a:solidFill>
-            <a:srgbClr val="00B050"/>
+            <a:srgbClr val="FFFF00"/>
           </a:solidFill>
         </p:spPr>
         <p:style>
@@ -40904,7 +41745,7 @@
             <a:pPr lvl="1"/>
             <a:r>
               <a:rPr lang="en-US" dirty="0" smtClean="0"/>
-              <a:t>Transversal (BFS/DFS) – O(n + m)</a:t>
+              <a:t>Traversal (BFS/DFS) – O(n + m)</a:t>
             </a:r>
           </a:p>
           <a:p>
@@ -41007,7 +41848,7 @@
           <a:p>
             <a:r>
               <a:rPr lang="en-US" dirty="0" smtClean="0"/>
-              <a:t>Parallel transversal</a:t>
+              <a:t>Parallel traversal</a:t>
             </a:r>
             <a:endParaRPr lang="en-US" dirty="0"/>
           </a:p>
@@ -42135,6 +42976,35 @@
           </a:fontRef>
         </p:style>
       </p:cxnSp>
+      <p:sp>
+        <p:nvSpPr>
+          <p:cNvPr id="41" name="TextBox 40"/>
+          <p:cNvSpPr txBox="1"/>
+          <p:nvPr/>
+        </p:nvSpPr>
+        <p:spPr>
+          <a:xfrm>
+            <a:off x="3364834" y="3449158"/>
+            <a:ext cx="1563248" cy="369332"/>
+          </a:xfrm>
+          <a:prstGeom prst="rect">
+            <a:avLst/>
+          </a:prstGeom>
+          <a:noFill/>
+        </p:spPr>
+        <p:txBody>
+          <a:bodyPr wrap="none" rtlCol="0">
+            <a:spAutoFit/>
+          </a:bodyPr>
+          <a:lstStyle/>
+          <a:p>
+            <a:r>
+              <a:rPr lang="en-US" dirty="0" smtClean="0"/>
+              <a:t>Green thread</a:t>
+            </a:r>
+          </a:p>
+        </p:txBody>
+      </p:sp>
     </p:spTree>
     <p:extLst>
       <p:ext uri="{BB962C8B-B14F-4D97-AF65-F5344CB8AC3E}">
@@ -42189,7 +43059,7 @@
           <a:p>
             <a:r>
               <a:rPr lang="en-US" dirty="0" smtClean="0"/>
-              <a:t>Parallel transversal</a:t>
+              <a:t>Parallel traversal</a:t>
             </a:r>
             <a:endParaRPr lang="en-US" dirty="0"/>
           </a:p>
@@ -42291,7 +43161,7 @@
           <a:p>
             <a:r>
               <a:rPr lang="en-US" dirty="0" smtClean="0"/>
-              <a:t>Parallel transversal</a:t>
+              <a:t>Parallel traversal</a:t>
             </a:r>
             <a:endParaRPr lang="en-US" dirty="0"/>
           </a:p>
@@ -42336,7 +43206,7 @@
         </p:xfrm>
         <a:graphic>
           <a:graphicData uri="http://schemas.openxmlformats.org/drawingml/2006/chart">
-            <c:chart xmlns:c="http://schemas.openxmlformats.org/drawingml/2006/chart" xmlns:r="http://schemas.openxmlformats.org/officeDocument/2006/relationships" r:id="rId2"/>
+            <c:chart xmlns:c="http://schemas.openxmlformats.org/drawingml/2006/chart" xmlns:r="http://schemas.openxmlformats.org/officeDocument/2006/relationships" r:id="rId3"/>
           </a:graphicData>
         </a:graphic>
       </p:graphicFrame>
@@ -42394,7 +43264,7 @@
           <a:p>
             <a:r>
               <a:rPr lang="en-US" dirty="0" smtClean="0"/>
-              <a:t>Parallel transversal with atomics</a:t>
+              <a:t>Parallel traversal with atomics</a:t>
             </a:r>
             <a:endParaRPr lang="en-US" dirty="0"/>
           </a:p>
@@ -42501,7 +43371,7 @@
           <a:p>
             <a:r>
               <a:rPr lang="en-US" dirty="0" smtClean="0"/>
-              <a:t>Parallel transversal with atomics</a:t>
+              <a:t>Parallel traversal with atomics</a:t>
             </a:r>
             <a:endParaRPr lang="en-US" dirty="0"/>
           </a:p>
@@ -42546,7 +43416,7 @@
         </p:xfrm>
         <a:graphic>
           <a:graphicData uri="http://schemas.openxmlformats.org/drawingml/2006/chart">
-            <c:chart xmlns:c="http://schemas.openxmlformats.org/drawingml/2006/chart" xmlns:r="http://schemas.openxmlformats.org/officeDocument/2006/relationships" r:id="rId2"/>
+            <c:chart xmlns:c="http://schemas.openxmlformats.org/drawingml/2006/chart" xmlns:r="http://schemas.openxmlformats.org/officeDocument/2006/relationships" r:id="rId3"/>
           </a:graphicData>
         </a:graphic>
       </p:graphicFrame>
@@ -42728,7 +43598,7 @@
         </p:xfrm>
         <a:graphic>
           <a:graphicData uri="http://schemas.openxmlformats.org/drawingml/2006/chart">
-            <c:chart xmlns:c="http://schemas.openxmlformats.org/drawingml/2006/chart" xmlns:r="http://schemas.openxmlformats.org/officeDocument/2006/relationships" r:id="rId2"/>
+            <c:chart xmlns:c="http://schemas.openxmlformats.org/drawingml/2006/chart" xmlns:r="http://schemas.openxmlformats.org/officeDocument/2006/relationships" r:id="rId3"/>
           </a:graphicData>
         </a:graphic>
       </p:graphicFrame>
@@ -42934,7 +43804,7 @@
         </p:xfrm>
         <a:graphic>
           <a:graphicData uri="http://schemas.openxmlformats.org/drawingml/2006/chart">
-            <c:chart xmlns:c="http://schemas.openxmlformats.org/drawingml/2006/chart" xmlns:r="http://schemas.openxmlformats.org/officeDocument/2006/relationships" r:id="rId2"/>
+            <c:chart xmlns:c="http://schemas.openxmlformats.org/drawingml/2006/chart" xmlns:r="http://schemas.openxmlformats.org/officeDocument/2006/relationships" r:id="rId3"/>
           </a:graphicData>
         </a:graphic>
       </p:graphicFrame>
@@ -43118,7 +43988,7 @@
           <a:p>
             <a:r>
               <a:rPr lang="en-US" dirty="0" smtClean="0"/>
-              <a:t>Lock free parallel transversal</a:t>
+              <a:t>Lock free parallel traversal</a:t>
             </a:r>
           </a:p>
           <a:p>
@@ -43710,14 +44580,14 @@
             <a:pPr lvl="1"/>
             <a:r>
               <a:rPr lang="en-US" dirty="0" smtClean="0"/>
-              <a:t>Best for small graphs: union find</a:t>
+              <a:t>Best overall: union find (even though traversal has better complexity)</a:t>
             </a:r>
           </a:p>
           <a:p>
             <a:pPr lvl="1"/>
             <a:r>
               <a:rPr lang="en-US" dirty="0" smtClean="0"/>
-              <a:t>Best for large graphs: parallel transversal with atomics</a:t>
+              <a:t>Best for very large graphs and plenty of cores: parallel traversal with atomics</a:t>
             </a:r>
           </a:p>
           <a:p>
@@ -43972,8 +44842,13 @@
           <a:p>
             <a:r>
               <a:rPr lang="en-US" dirty="0"/>
-              <a:t>Serial transversal</a:t>
+              <a:t>Serial </a:t>
             </a:r>
+            <a:r>
+              <a:rPr lang="en-US" dirty="0" smtClean="0"/>
+              <a:t>traversal</a:t>
+            </a:r>
+            <a:endParaRPr lang="en-US" dirty="0"/>
           </a:p>
         </p:txBody>
       </p:sp>
@@ -45053,8 +45928,13 @@
           <a:p>
             <a:r>
               <a:rPr lang="en-US" dirty="0"/>
-              <a:t>Serial transversal</a:t>
+              <a:t>Serial </a:t>
             </a:r>
+            <a:r>
+              <a:rPr lang="en-US" dirty="0" smtClean="0"/>
+              <a:t>traversal</a:t>
+            </a:r>
+            <a:endParaRPr lang="en-US" dirty="0"/>
           </a:p>
         </p:txBody>
       </p:sp>
@@ -46134,8 +47014,13 @@
           <a:p>
             <a:r>
               <a:rPr lang="en-US" dirty="0"/>
-              <a:t>Serial transversal</a:t>
+              <a:t>Serial </a:t>
             </a:r>
+            <a:r>
+              <a:rPr lang="en-US" dirty="0" smtClean="0"/>
+              <a:t>traversal</a:t>
+            </a:r>
+            <a:endParaRPr lang="en-US" dirty="0"/>
           </a:p>
         </p:txBody>
       </p:sp>

</xml_diff>